<commit_message>
provide an input value to choose the protocol for the data
</commit_message>
<xml_diff>
--- a/AE Cloud2 Arduino Digilent GPS UART Header.pptx
+++ b/AE Cloud2 Arduino Digilent GPS UART Header.pptx
@@ -8,9 +8,11 @@
     <p:sldId id="256" r:id="rId2"/>
     <p:sldId id="260" r:id="rId3"/>
     <p:sldId id="261" r:id="rId4"/>
-    <p:sldId id="257" r:id="rId5"/>
-    <p:sldId id="258" r:id="rId6"/>
-    <p:sldId id="259" r:id="rId7"/>
+    <p:sldId id="264" r:id="rId5"/>
+    <p:sldId id="262" r:id="rId6"/>
+    <p:sldId id="258" r:id="rId7"/>
+    <p:sldId id="263" r:id="rId8"/>
+    <p:sldId id="259" r:id="rId9"/>
   </p:sldIdLst>
   <p:sldSz cx="12192000" cy="6858000"/>
   <p:notesSz cx="6858000" cy="9144000"/>
@@ -109,6 +111,11 @@
       </a:defRPr>
     </a:lvl9pPr>
   </p:defaultTextStyle>
+  <p:extLst>
+    <p:ext uri="{EFAFB233-063F-42B5-8137-9DF3F51BA10A}">
+      <p15:sldGuideLst xmlns:p15="http://schemas.microsoft.com/office/powerpoint/2012/main"/>
+    </p:ext>
+  </p:extLst>
 </p:presentation>
 </file>
 
@@ -259,7 +266,7 @@
           <a:p>
             <a:fld id="{AD01F849-78E8-4684-93F3-B8702220BFC7}" type="datetimeFigureOut">
               <a:rPr lang="en-US" smtClean="0"/>
-              <a:t>4/3/2019</a:t>
+              <a:t>4/5/2019</a:t>
             </a:fld>
             <a:endParaRPr lang="en-US"/>
           </a:p>
@@ -457,7 +464,7 @@
           <a:p>
             <a:fld id="{AD01F849-78E8-4684-93F3-B8702220BFC7}" type="datetimeFigureOut">
               <a:rPr lang="en-US" smtClean="0"/>
-              <a:t>4/3/2019</a:t>
+              <a:t>4/5/2019</a:t>
             </a:fld>
             <a:endParaRPr lang="en-US"/>
           </a:p>
@@ -665,7 +672,7 @@
           <a:p>
             <a:fld id="{AD01F849-78E8-4684-93F3-B8702220BFC7}" type="datetimeFigureOut">
               <a:rPr lang="en-US" smtClean="0"/>
-              <a:t>4/3/2019</a:t>
+              <a:t>4/5/2019</a:t>
             </a:fld>
             <a:endParaRPr lang="en-US"/>
           </a:p>
@@ -863,7 +870,7 @@
           <a:p>
             <a:fld id="{AD01F849-78E8-4684-93F3-B8702220BFC7}" type="datetimeFigureOut">
               <a:rPr lang="en-US" smtClean="0"/>
-              <a:t>4/3/2019</a:t>
+              <a:t>4/5/2019</a:t>
             </a:fld>
             <a:endParaRPr lang="en-US"/>
           </a:p>
@@ -1138,7 +1145,7 @@
           <a:p>
             <a:fld id="{AD01F849-78E8-4684-93F3-B8702220BFC7}" type="datetimeFigureOut">
               <a:rPr lang="en-US" smtClean="0"/>
-              <a:t>4/3/2019</a:t>
+              <a:t>4/5/2019</a:t>
             </a:fld>
             <a:endParaRPr lang="en-US"/>
           </a:p>
@@ -1403,7 +1410,7 @@
           <a:p>
             <a:fld id="{AD01F849-78E8-4684-93F3-B8702220BFC7}" type="datetimeFigureOut">
               <a:rPr lang="en-US" smtClean="0"/>
-              <a:t>4/3/2019</a:t>
+              <a:t>4/5/2019</a:t>
             </a:fld>
             <a:endParaRPr lang="en-US"/>
           </a:p>
@@ -1815,7 +1822,7 @@
           <a:p>
             <a:fld id="{AD01F849-78E8-4684-93F3-B8702220BFC7}" type="datetimeFigureOut">
               <a:rPr lang="en-US" smtClean="0"/>
-              <a:t>4/3/2019</a:t>
+              <a:t>4/5/2019</a:t>
             </a:fld>
             <a:endParaRPr lang="en-US"/>
           </a:p>
@@ -1956,7 +1963,7 @@
           <a:p>
             <a:fld id="{AD01F849-78E8-4684-93F3-B8702220BFC7}" type="datetimeFigureOut">
               <a:rPr lang="en-US" smtClean="0"/>
-              <a:t>4/3/2019</a:t>
+              <a:t>4/5/2019</a:t>
             </a:fld>
             <a:endParaRPr lang="en-US"/>
           </a:p>
@@ -2069,7 +2076,7 @@
           <a:p>
             <a:fld id="{AD01F849-78E8-4684-93F3-B8702220BFC7}" type="datetimeFigureOut">
               <a:rPr lang="en-US" smtClean="0"/>
-              <a:t>4/3/2019</a:t>
+              <a:t>4/5/2019</a:t>
             </a:fld>
             <a:endParaRPr lang="en-US"/>
           </a:p>
@@ -2380,7 +2387,7 @@
           <a:p>
             <a:fld id="{AD01F849-78E8-4684-93F3-B8702220BFC7}" type="datetimeFigureOut">
               <a:rPr lang="en-US" smtClean="0"/>
-              <a:t>4/3/2019</a:t>
+              <a:t>4/5/2019</a:t>
             </a:fld>
             <a:endParaRPr lang="en-US"/>
           </a:p>
@@ -2668,7 +2675,7 @@
           <a:p>
             <a:fld id="{AD01F849-78E8-4684-93F3-B8702220BFC7}" type="datetimeFigureOut">
               <a:rPr lang="en-US" smtClean="0"/>
-              <a:t>4/3/2019</a:t>
+              <a:t>4/5/2019</a:t>
             </a:fld>
             <a:endParaRPr lang="en-US"/>
           </a:p>
@@ -2909,7 +2916,7 @@
           <a:p>
             <a:fld id="{AD01F849-78E8-4684-93F3-B8702220BFC7}" type="datetimeFigureOut">
               <a:rPr lang="en-US" smtClean="0"/>
-              <a:t>4/3/2019</a:t>
+              <a:t>4/5/2019</a:t>
             </a:fld>
             <a:endParaRPr lang="en-US"/>
           </a:p>
@@ -3630,7 +3637,7 @@
           <p:cNvPr id="2" name="Title 1">
             <a:extLst>
               <a:ext uri="{FF2B5EF4-FFF2-40B4-BE49-F238E27FC236}">
-                <a16:creationId xmlns:a16="http://schemas.microsoft.com/office/drawing/2014/main" id="{1D03A3CA-09B9-42A2-92B1-B097E4EBBC1E}"/>
+                <a16:creationId xmlns:a16="http://schemas.microsoft.com/office/drawing/2014/main" id="{25A55CD4-2A3F-4F48-8190-226B3922931E}"/>
               </a:ext>
             </a:extLst>
           </p:cNvPr>
@@ -3643,28 +3650,13 @@
         </p:nvSpPr>
         <p:spPr/>
         <p:txBody>
-          <a:bodyPr>
-            <a:normAutofit fontScale="90000"/>
-          </a:bodyPr>
-          <a:lstStyle/>
-          <a:p>
-            <a:r>
-              <a:rPr lang="en-US" dirty="0"/>
-              <a:t>Output data:</a:t>
-            </a:r>
-            <a:br>
-              <a:rPr lang="en-US" dirty="0"/>
-            </a:br>
-            <a:r>
-              <a:rPr lang="en-US" dirty="0"/>
-              <a:t>1. GPS protocols are being displayed.</a:t>
-            </a:r>
-            <a:br>
-              <a:rPr lang="en-US" dirty="0"/>
-            </a:br>
-            <a:r>
-              <a:rPr lang="en-US" dirty="0"/>
-              <a:t>2. GPS location is extracted from GPRMC packet.</a:t>
+          <a:bodyPr/>
+          <a:lstStyle/>
+          <a:p>
+            <a:pPr algn="ctr"/>
+            <a:r>
+              <a:rPr lang="en-US"/>
+              <a:t>Data Packet Format</a:t>
             </a:r>
           </a:p>
         </p:txBody>
@@ -3674,7 +3666,7 @@
           <p:cNvPr id="4" name="Content Placeholder 3">
             <a:extLst>
               <a:ext uri="{FF2B5EF4-FFF2-40B4-BE49-F238E27FC236}">
-                <a16:creationId xmlns:a16="http://schemas.microsoft.com/office/drawing/2014/main" id="{5D680D47-1779-4823-9F1C-00BC355A5805}"/>
+                <a16:creationId xmlns:a16="http://schemas.microsoft.com/office/drawing/2014/main" id="{C4A32879-A711-4DB9-B38C-DA7995761A7D}"/>
               </a:ext>
             </a:extLst>
           </p:cNvPr>
@@ -3704,7 +3696,7 @@
     </p:spTree>
     <p:extLst>
       <p:ext uri="{BB962C8B-B14F-4D97-AF65-F5344CB8AC3E}">
-        <p14:creationId xmlns:p14="http://schemas.microsoft.com/office/powerpoint/2010/main" val="1332490654"/>
+        <p14:creationId xmlns:p14="http://schemas.microsoft.com/office/powerpoint/2010/main" val="437762684"/>
       </p:ext>
     </p:extLst>
   </p:cSld>
@@ -3715,6 +3707,211 @@
 </file>
 
 <file path=ppt/slides/slide5.xml><?xml version="1.0" encoding="utf-8"?>
+<p:sld xmlns:a="http://schemas.openxmlformats.org/drawingml/2006/main" xmlns:r="http://schemas.openxmlformats.org/officeDocument/2006/relationships" xmlns:p="http://schemas.openxmlformats.org/presentationml/2006/main">
+  <p:cSld>
+    <p:spTree>
+      <p:nvGrpSpPr>
+        <p:cNvPr id="1" name=""/>
+        <p:cNvGrpSpPr/>
+        <p:nvPr/>
+      </p:nvGrpSpPr>
+      <p:grpSpPr>
+        <a:xfrm>
+          <a:off x="0" y="0"/>
+          <a:ext cx="0" cy="0"/>
+          <a:chOff x="0" y="0"/>
+          <a:chExt cx="0" cy="0"/>
+        </a:xfrm>
+      </p:grpSpPr>
+      <p:sp>
+        <p:nvSpPr>
+          <p:cNvPr id="2" name="Title 1">
+            <a:extLst>
+              <a:ext uri="{FF2B5EF4-FFF2-40B4-BE49-F238E27FC236}">
+                <a16:creationId xmlns:a16="http://schemas.microsoft.com/office/drawing/2014/main" id="{919B1A7A-FB0D-4209-A531-CF09276427FC}"/>
+              </a:ext>
+            </a:extLst>
+          </p:cNvPr>
+          <p:cNvSpPr>
+            <a:spLocks noGrp="1"/>
+          </p:cNvSpPr>
+          <p:nvPr>
+            <p:ph type="title"/>
+          </p:nvPr>
+        </p:nvSpPr>
+        <p:spPr/>
+        <p:txBody>
+          <a:bodyPr/>
+          <a:lstStyle/>
+          <a:p>
+            <a:r>
+              <a:rPr lang="en-US" dirty="0"/>
+              <a:t>GPGGA protocol with checksum verified.</a:t>
+            </a:r>
+          </a:p>
+        </p:txBody>
+      </p:sp>
+      <p:sp>
+        <p:nvSpPr>
+          <p:cNvPr id="5" name="TextBox 4">
+            <a:extLst>
+              <a:ext uri="{FF2B5EF4-FFF2-40B4-BE49-F238E27FC236}">
+                <a16:creationId xmlns:a16="http://schemas.microsoft.com/office/drawing/2014/main" id="{0935C8DB-0720-46B8-9F18-07EDF5092085}"/>
+              </a:ext>
+            </a:extLst>
+          </p:cNvPr>
+          <p:cNvSpPr txBox="1"/>
+          <p:nvPr/>
+        </p:nvSpPr>
+        <p:spPr>
+          <a:xfrm>
+            <a:off x="4976212" y="2279797"/>
+            <a:ext cx="5872796" cy="3970318"/>
+          </a:xfrm>
+          <a:prstGeom prst="rect">
+            <a:avLst/>
+          </a:prstGeom>
+          <a:noFill/>
+        </p:spPr>
+        <p:txBody>
+          <a:bodyPr wrap="square" rtlCol="0">
+            <a:spAutoFit/>
+          </a:bodyPr>
+          <a:lstStyle/>
+          <a:p>
+            <a:r>
+              <a:rPr lang="en-US" dirty="0"/>
+              <a:t>===============================</a:t>
+            </a:r>
+          </a:p>
+          <a:p>
+            <a:r>
+              <a:rPr lang="en-US" dirty="0"/>
+              <a:t>Found GPGGA format</a:t>
+            </a:r>
+          </a:p>
+          <a:p>
+            <a:r>
+              <a:rPr lang="en-US" dirty="0"/>
+              <a:t>$GPGGA 221058.000 3722.9923 N 12151.6026 W 2 7 1.18 38.7 M -25.5 M 0000 0000*5C</a:t>
+            </a:r>
+          </a:p>
+          <a:p>
+            <a:r>
+              <a:rPr lang="en-US" dirty="0" err="1"/>
+              <a:t>val</a:t>
+            </a:r>
+            <a:r>
+              <a:rPr lang="en-US" dirty="0"/>
+              <a:t> =6</a:t>
+            </a:r>
+          </a:p>
+          <a:p>
+            <a:r>
+              <a:rPr lang="en-US" dirty="0"/>
+              <a:t>Extract data successfully.  Valid data status!</a:t>
+            </a:r>
+          </a:p>
+          <a:p>
+            <a:r>
+              <a:rPr lang="en-US" dirty="0"/>
+              <a:t>id =$GPGGA</a:t>
+            </a:r>
+          </a:p>
+          <a:p>
+            <a:r>
+              <a:rPr lang="en-US" dirty="0"/>
+              <a:t>HHMMSS.SS =221058.000</a:t>
+            </a:r>
+          </a:p>
+          <a:p>
+            <a:r>
+              <a:rPr lang="en-US" dirty="0"/>
+              <a:t>latitude =3722.9923</a:t>
+            </a:r>
+          </a:p>
+          <a:p>
+            <a:r>
+              <a:rPr lang="en-US" dirty="0" err="1"/>
+              <a:t>ns_dir</a:t>
+            </a:r>
+            <a:r>
+              <a:rPr lang="en-US" dirty="0"/>
+              <a:t> =N</a:t>
+            </a:r>
+          </a:p>
+          <a:p>
+            <a:r>
+              <a:rPr lang="en-US" dirty="0"/>
+              <a:t>longitude =12151.6026</a:t>
+            </a:r>
+          </a:p>
+          <a:p>
+            <a:r>
+              <a:rPr lang="en-US" dirty="0" err="1"/>
+              <a:t>ew_dir</a:t>
+            </a:r>
+            <a:r>
+              <a:rPr lang="en-US" dirty="0"/>
+              <a:t> =W</a:t>
+            </a:r>
+          </a:p>
+          <a:p>
+            <a:r>
+              <a:rPr lang="en-US" dirty="0"/>
+              <a:t>Latitude =    37.39 Longitude =  -121.87</a:t>
+            </a:r>
+          </a:p>
+          <a:p>
+            <a:endParaRPr lang="en-US" dirty="0"/>
+          </a:p>
+        </p:txBody>
+      </p:sp>
+      <p:pic>
+        <p:nvPicPr>
+          <p:cNvPr id="8" name="Content Placeholder 7">
+            <a:extLst>
+              <a:ext uri="{FF2B5EF4-FFF2-40B4-BE49-F238E27FC236}">
+                <a16:creationId xmlns:a16="http://schemas.microsoft.com/office/drawing/2014/main" id="{8E2F4099-2DAB-49D2-895D-8A58D5A339B4}"/>
+              </a:ext>
+            </a:extLst>
+          </p:cNvPr>
+          <p:cNvPicPr>
+            <a:picLocks noGrp="1" noChangeAspect="1"/>
+          </p:cNvPicPr>
+          <p:nvPr>
+            <p:ph idx="1"/>
+          </p:nvPr>
+        </p:nvPicPr>
+        <p:blipFill rotWithShape="1">
+          <a:blip r:embed="rId2"/>
+          <a:srcRect r="57353"/>
+          <a:stretch/>
+        </p:blipFill>
+        <p:spPr>
+          <a:xfrm>
+            <a:off x="987172" y="1817460"/>
+            <a:ext cx="3299077" cy="4351338"/>
+          </a:xfrm>
+          <a:prstGeom prst="rect">
+            <a:avLst/>
+          </a:prstGeom>
+        </p:spPr>
+      </p:pic>
+    </p:spTree>
+    <p:extLst>
+      <p:ext uri="{BB962C8B-B14F-4D97-AF65-F5344CB8AC3E}">
+        <p14:creationId xmlns:p14="http://schemas.microsoft.com/office/powerpoint/2010/main" val="87611036"/>
+      </p:ext>
+    </p:extLst>
+  </p:cSld>
+  <p:clrMapOvr>
+    <a:masterClrMapping/>
+  </p:clrMapOvr>
+</p:sld>
+</file>
+
+<file path=ppt/slides/slide6.xml><?xml version="1.0" encoding="utf-8"?>
 <p:sld xmlns:a="http://schemas.openxmlformats.org/drawingml/2006/main" xmlns:r="http://schemas.openxmlformats.org/officeDocument/2006/relationships" xmlns:p="http://schemas.openxmlformats.org/presentationml/2006/main">
   <p:cSld>
     <p:spTree>
@@ -3805,7 +4002,230 @@
 </p:sld>
 </file>
 
-<file path=ppt/slides/slide6.xml><?xml version="1.0" encoding="utf-8"?>
+<file path=ppt/slides/slide7.xml><?xml version="1.0" encoding="utf-8"?>
+<p:sld xmlns:a="http://schemas.openxmlformats.org/drawingml/2006/main" xmlns:r="http://schemas.openxmlformats.org/officeDocument/2006/relationships" xmlns:p="http://schemas.openxmlformats.org/presentationml/2006/main">
+  <p:cSld>
+    <p:spTree>
+      <p:nvGrpSpPr>
+        <p:cNvPr id="1" name=""/>
+        <p:cNvGrpSpPr/>
+        <p:nvPr/>
+      </p:nvGrpSpPr>
+      <p:grpSpPr>
+        <a:xfrm>
+          <a:off x="0" y="0"/>
+          <a:ext cx="0" cy="0"/>
+          <a:chOff x="0" y="0"/>
+          <a:chExt cx="0" cy="0"/>
+        </a:xfrm>
+      </p:grpSpPr>
+      <p:sp>
+        <p:nvSpPr>
+          <p:cNvPr id="2" name="Title 1">
+            <a:extLst>
+              <a:ext uri="{FF2B5EF4-FFF2-40B4-BE49-F238E27FC236}">
+                <a16:creationId xmlns:a16="http://schemas.microsoft.com/office/drawing/2014/main" id="{726D026B-E28C-4B1B-8A10-6F3E3C9C5B67}"/>
+              </a:ext>
+            </a:extLst>
+          </p:cNvPr>
+          <p:cNvSpPr>
+            <a:spLocks noGrp="1"/>
+          </p:cNvSpPr>
+          <p:nvPr>
+            <p:ph type="title"/>
+          </p:nvPr>
+        </p:nvSpPr>
+        <p:spPr/>
+        <p:txBody>
+          <a:bodyPr/>
+          <a:lstStyle/>
+          <a:p>
+            <a:r>
+              <a:rPr lang="en-US" dirty="0"/>
+              <a:t>GPRMC protocol with checksum verified.</a:t>
+            </a:r>
+          </a:p>
+        </p:txBody>
+      </p:sp>
+      <p:pic>
+        <p:nvPicPr>
+          <p:cNvPr id="4" name="Content Placeholder 3">
+            <a:extLst>
+              <a:ext uri="{FF2B5EF4-FFF2-40B4-BE49-F238E27FC236}">
+                <a16:creationId xmlns:a16="http://schemas.microsoft.com/office/drawing/2014/main" id="{86FCFA9B-4EEA-4B14-800D-D842552598FB}"/>
+              </a:ext>
+            </a:extLst>
+          </p:cNvPr>
+          <p:cNvPicPr>
+            <a:picLocks noGrp="1" noChangeAspect="1"/>
+          </p:cNvPicPr>
+          <p:nvPr>
+            <p:ph idx="1"/>
+          </p:nvPr>
+        </p:nvPicPr>
+        <p:blipFill rotWithShape="1">
+          <a:blip r:embed="rId2"/>
+          <a:srcRect r="59850" b="-167"/>
+          <a:stretch/>
+        </p:blipFill>
+        <p:spPr>
+          <a:xfrm>
+            <a:off x="1249576" y="1857710"/>
+            <a:ext cx="3105856" cy="4358606"/>
+          </a:xfrm>
+          <a:prstGeom prst="rect">
+            <a:avLst/>
+          </a:prstGeom>
+        </p:spPr>
+      </p:pic>
+      <p:sp>
+        <p:nvSpPr>
+          <p:cNvPr id="5" name="TextBox 4">
+            <a:extLst>
+              <a:ext uri="{FF2B5EF4-FFF2-40B4-BE49-F238E27FC236}">
+                <a16:creationId xmlns:a16="http://schemas.microsoft.com/office/drawing/2014/main" id="{5FA6E6C2-8B78-4BAF-85A2-DD6151FF1A41}"/>
+              </a:ext>
+            </a:extLst>
+          </p:cNvPr>
+          <p:cNvSpPr txBox="1"/>
+          <p:nvPr/>
+        </p:nvSpPr>
+        <p:spPr>
+          <a:xfrm>
+            <a:off x="5058133" y="1792561"/>
+            <a:ext cx="6020803" cy="4801314"/>
+          </a:xfrm>
+          <a:prstGeom prst="rect">
+            <a:avLst/>
+          </a:prstGeom>
+          <a:noFill/>
+        </p:spPr>
+        <p:txBody>
+          <a:bodyPr wrap="square" rtlCol="0">
+            <a:spAutoFit/>
+          </a:bodyPr>
+          <a:lstStyle/>
+          <a:p>
+            <a:r>
+              <a:rPr lang="en-US" dirty="0"/>
+              <a:t>===============================</a:t>
+            </a:r>
+          </a:p>
+          <a:p>
+            <a:r>
+              <a:rPr lang="en-US" dirty="0"/>
+              <a:t>Found GPRMC format</a:t>
+            </a:r>
+          </a:p>
+          <a:p>
+            <a:r>
+              <a:rPr lang="en-US" dirty="0"/>
+              <a:t>$GPRMC 220859.000 A 3722.9907 N 12151.6017 W 0.23 317.50 050419   D*70</a:t>
+            </a:r>
+          </a:p>
+          <a:p>
+            <a:r>
+              <a:rPr lang="en-US" dirty="0" err="1"/>
+              <a:t>val</a:t>
+            </a:r>
+            <a:r>
+              <a:rPr lang="en-US" dirty="0"/>
+              <a:t> =10</a:t>
+            </a:r>
+          </a:p>
+          <a:p>
+            <a:r>
+              <a:rPr lang="en-US" dirty="0"/>
+              <a:t>Extract data successfully.  Valid data status!</a:t>
+            </a:r>
+          </a:p>
+          <a:p>
+            <a:r>
+              <a:rPr lang="en-US" dirty="0"/>
+              <a:t>id =$GPRMC</a:t>
+            </a:r>
+          </a:p>
+          <a:p>
+            <a:r>
+              <a:rPr lang="en-US" dirty="0"/>
+              <a:t>HHMMSS.SS =220859.000</a:t>
+            </a:r>
+          </a:p>
+          <a:p>
+            <a:r>
+              <a:rPr lang="en-US" dirty="0"/>
+              <a:t>latitude =3722.9907</a:t>
+            </a:r>
+          </a:p>
+          <a:p>
+            <a:r>
+              <a:rPr lang="en-US" dirty="0" err="1"/>
+              <a:t>ns_dir</a:t>
+            </a:r>
+            <a:r>
+              <a:rPr lang="en-US" dirty="0"/>
+              <a:t> =N</a:t>
+            </a:r>
+          </a:p>
+          <a:p>
+            <a:r>
+              <a:rPr lang="en-US" dirty="0"/>
+              <a:t>longitude =12151.6017</a:t>
+            </a:r>
+          </a:p>
+          <a:p>
+            <a:r>
+              <a:rPr lang="en-US" dirty="0" err="1"/>
+              <a:t>ew_dir</a:t>
+            </a:r>
+            <a:r>
+              <a:rPr lang="en-US" dirty="0"/>
+              <a:t> =W</a:t>
+            </a:r>
+          </a:p>
+          <a:p>
+            <a:r>
+              <a:rPr lang="en-US" dirty="0"/>
+              <a:t>Status =A</a:t>
+            </a:r>
+          </a:p>
+          <a:p>
+            <a:r>
+              <a:rPr lang="en-US" dirty="0"/>
+              <a:t> [Valid Data Status]</a:t>
+            </a:r>
+          </a:p>
+          <a:p>
+            <a:r>
+              <a:rPr lang="en-US" dirty="0"/>
+              <a:t>date =050419</a:t>
+            </a:r>
+          </a:p>
+          <a:p>
+            <a:r>
+              <a:rPr lang="en-US" dirty="0"/>
+              <a:t>Latitude =    37.39 Longitude =  -121.87</a:t>
+            </a:r>
+          </a:p>
+          <a:p>
+            <a:endParaRPr lang="en-US" dirty="0"/>
+          </a:p>
+        </p:txBody>
+      </p:sp>
+    </p:spTree>
+    <p:extLst>
+      <p:ext uri="{BB962C8B-B14F-4D97-AF65-F5344CB8AC3E}">
+        <p14:creationId xmlns:p14="http://schemas.microsoft.com/office/powerpoint/2010/main" val="2872210040"/>
+      </p:ext>
+    </p:extLst>
+  </p:cSld>
+  <p:clrMapOvr>
+    <a:masterClrMapping/>
+  </p:clrMapOvr>
+</p:sld>
+</file>
+
+<file path=ppt/slides/slide8.xml><?xml version="1.0" encoding="utf-8"?>
 <p:sld xmlns:a="http://schemas.openxmlformats.org/drawingml/2006/main" xmlns:r="http://schemas.openxmlformats.org/officeDocument/2006/relationships" xmlns:p="http://schemas.openxmlformats.org/presentationml/2006/main">
   <p:cSld>
     <p:spTree>

</xml_diff>